<commit_message>
v1 Beta - PPT - Updated
</commit_message>
<xml_diff>
--- a/Vax Track V1 - Beta.pptx
+++ b/Vax Track V1 - Beta.pptx
@@ -13499,7 +13499,7 @@
               <a:buNone/>
             </a:pPr>
             <a:r>
-              <a:rPr lang="en-US" sz="1700" b="0" i="0">
+              <a:rPr lang="en-US" sz="1700" b="0" i="0" dirty="0">
                 <a:effectLst/>
               </a:rPr>
               <a:t>To wrap up, our Vax Track vaccination portal, built with the ASP.NET MVC framework, simplifies the vaccination process for users and administrators alike. It offers easy registration, slot booking, and robust admin tools for managing approvals and slot availability. This project not only meets current needs but also sets the stage for future improvements in public health management. Thank you for your time.</a:t>
@@ -13509,26 +13509,26 @@
             <a:pPr marL="0" indent="0">
               <a:buNone/>
             </a:pPr>
-            <a:endParaRPr lang="en-US" sz="1700"/>
+            <a:endParaRPr lang="en-US" sz="1700" dirty="0"/>
           </a:p>
           <a:p>
             <a:pPr marL="0" indent="0">
               <a:buNone/>
             </a:pPr>
-            <a:endParaRPr lang="en-US" sz="1700"/>
+            <a:endParaRPr lang="en-US" sz="1700" dirty="0"/>
           </a:p>
           <a:p>
             <a:pPr marL="0" indent="0">
               <a:buNone/>
             </a:pPr>
-            <a:endParaRPr lang="en-US" sz="1700"/>
+            <a:endParaRPr lang="en-US" sz="1700" dirty="0"/>
           </a:p>
           <a:p>
             <a:pPr marL="0" indent="0">
               <a:buNone/>
             </a:pPr>
             <a:r>
-              <a:rPr lang="en-US" sz="1700"/>
+              <a:rPr lang="en-US" sz="1700" dirty="0"/>
               <a:t>Thank You</a:t>
             </a:r>
           </a:p>
@@ -13537,18 +13537,14 @@
               <a:buNone/>
             </a:pPr>
             <a:r>
-              <a:rPr lang="en-US" sz="1700"/>
-              <a:t>Vivek Kumar | Associate Consultant | Infosys</a:t>
+              <a:rPr lang="en-US" sz="1700" dirty="0"/>
+              <a:t>Vivek Kumar | Associate Consultant </a:t>
             </a:r>
-          </a:p>
-          <a:p>
-            <a:pPr marL="0" indent="0">
-              <a:buNone/>
-            </a:pPr>
             <a:r>
               <a:rPr lang="en-US" sz="1700"/>
-              <a:t>1363410</a:t>
+              <a:t>| Infosys</a:t>
             </a:r>
+            <a:endParaRPr lang="en-US" sz="1700" dirty="0"/>
           </a:p>
         </p:txBody>
       </p:sp>

</xml_diff>